<commit_message>
Including my final git push for final day of project
</commit_message>
<xml_diff>
--- a/LibraryAPI/Book System Plan.pptx
+++ b/LibraryAPI/Book System Plan.pptx
@@ -8,6 +8,7 @@
     <p:sldId id="256" r:id="rId2"/>
     <p:sldId id="257" r:id="rId3"/>
     <p:sldId id="258" r:id="rId4"/>
+    <p:sldId id="259" r:id="rId5"/>
   </p:sldIdLst>
   <p:sldSz cx="12192000" cy="6858000"/>
   <p:notesSz cx="6858000" cy="9144000"/>
@@ -5793,6 +5794,106 @@
 </p:sld>
 </file>
 
+<file path=ppt/slides/slide4.xml><?xml version="1.0" encoding="utf-8"?>
+<p:sld xmlns:a="http://schemas.openxmlformats.org/drawingml/2006/main" xmlns:r="http://schemas.openxmlformats.org/officeDocument/2006/relationships" xmlns:p="http://schemas.openxmlformats.org/presentationml/2006/main">
+  <p:cSld>
+    <p:spTree>
+      <p:nvGrpSpPr>
+        <p:cNvPr id="1" name=""/>
+        <p:cNvGrpSpPr/>
+        <p:nvPr/>
+      </p:nvGrpSpPr>
+      <p:grpSpPr>
+        <a:xfrm>
+          <a:off x="0" y="0"/>
+          <a:ext cx="0" cy="0"/>
+          <a:chOff x="0" y="0"/>
+          <a:chExt cx="0" cy="0"/>
+        </a:xfrm>
+      </p:grpSpPr>
+      <p:pic>
+        <p:nvPicPr>
+          <p:cNvPr id="4" name="Picture 3">
+            <a:extLst>
+              <a:ext uri="{FF2B5EF4-FFF2-40B4-BE49-F238E27FC236}">
+                <a16:creationId xmlns:a16="http://schemas.microsoft.com/office/drawing/2014/main" id="{055B7A5F-FB3D-4277-8E00-A7BFA767EA5A}"/>
+              </a:ext>
+            </a:extLst>
+          </p:cNvPr>
+          <p:cNvPicPr>
+            <a:picLocks noChangeAspect="1"/>
+          </p:cNvPicPr>
+          <p:nvPr/>
+        </p:nvPicPr>
+        <p:blipFill>
+          <a:blip r:embed="rId2"/>
+          <a:stretch>
+            <a:fillRect/>
+          </a:stretch>
+        </p:blipFill>
+        <p:spPr>
+          <a:xfrm>
+            <a:off x="3620627" y="234178"/>
+            <a:ext cx="4781693" cy="6623821"/>
+          </a:xfrm>
+          <a:prstGeom prst="rect">
+            <a:avLst/>
+          </a:prstGeom>
+        </p:spPr>
+      </p:pic>
+      <p:sp>
+        <p:nvSpPr>
+          <p:cNvPr id="5" name="TextBox 4">
+            <a:extLst>
+              <a:ext uri="{FF2B5EF4-FFF2-40B4-BE49-F238E27FC236}">
+                <a16:creationId xmlns:a16="http://schemas.microsoft.com/office/drawing/2014/main" id="{2C7B592D-6D9D-42F2-BE92-6223A2036E90}"/>
+              </a:ext>
+            </a:extLst>
+          </p:cNvPr>
+          <p:cNvSpPr txBox="1"/>
+          <p:nvPr/>
+        </p:nvSpPr>
+        <p:spPr>
+          <a:xfrm>
+            <a:off x="476250" y="390525"/>
+            <a:ext cx="2562225" cy="646331"/>
+          </a:xfrm>
+          <a:prstGeom prst="rect">
+            <a:avLst/>
+          </a:prstGeom>
+          <a:noFill/>
+        </p:spPr>
+        <p:txBody>
+          <a:bodyPr wrap="square" rtlCol="0">
+            <a:spAutoFit/>
+          </a:bodyPr>
+          <a:lstStyle/>
+          <a:p>
+            <a:r>
+              <a:rPr lang="en-GB" dirty="0"/>
+              <a:t>Adding my git commits to </a:t>
+            </a:r>
+            <a:r>
+              <a:rPr lang="en-GB" dirty="0" err="1"/>
+              <a:t>github</a:t>
+            </a:r>
+            <a:endParaRPr lang="en-GB" dirty="0"/>
+          </a:p>
+        </p:txBody>
+      </p:sp>
+    </p:spTree>
+    <p:extLst>
+      <p:ext uri="{BB962C8B-B14F-4D97-AF65-F5344CB8AC3E}">
+        <p14:creationId xmlns:p14="http://schemas.microsoft.com/office/powerpoint/2010/main" val="339917280"/>
+      </p:ext>
+    </p:extLst>
+  </p:cSld>
+  <p:clrMapOvr>
+    <a:masterClrMapping/>
+  </p:clrMapOvr>
+</p:sld>
+</file>
+
 <file path=ppt/theme/theme1.xml><?xml version="1.0" encoding="utf-8"?>
 <a:theme xmlns:a="http://schemas.openxmlformats.org/drawingml/2006/main" name="Office Theme">
   <a:themeElements>

</xml_diff>